<commit_message>
slight updates to wd and typos
</commit_message>
<xml_diff>
--- a/Lessons/G_RF_TimeSeries/RandomForests.pptx
+++ b/Lessons/G_RF_TimeSeries/RandomForests.pptx
@@ -8,8 +8,8 @@
     <p:notesMasterId r:id="rId12"/>
   </p:notesMasterIdLst>
   <p:sldIdLst>
-    <p:sldId id="359" r:id="rId2"/>
-    <p:sldId id="335" r:id="rId3"/>
+    <p:sldId id="335" r:id="rId2"/>
+    <p:sldId id="372" r:id="rId3"/>
     <p:sldId id="336" r:id="rId4"/>
     <p:sldId id="371" r:id="rId5"/>
     <p:sldId id="337" r:id="rId6"/>
@@ -220,7 +220,7 @@
           <a:p>
             <a:fld id="{B0C0A60C-850A-4EA4-9C14-A8FE98B94505}" type="datetimeFigureOut">
               <a:rPr lang="en-US" smtClean="0"/>
-              <a:t>10/26/20</a:t>
+              <a:t>3/22/21</a:t>
             </a:fld>
             <a:endParaRPr lang="en-US"/>
           </a:p>
@@ -506,6 +506,90 @@
       </p:grpSpPr>
       <p:sp>
         <p:nvSpPr>
+          <p:cNvPr id="2" name="Slide Image Placeholder 1"/>
+          <p:cNvSpPr>
+            <a:spLocks noGrp="1" noRot="1" noChangeAspect="1"/>
+          </p:cNvSpPr>
+          <p:nvPr>
+            <p:ph type="sldImg"/>
+          </p:nvPr>
+        </p:nvSpPr>
+        <p:spPr/>
+      </p:sp>
+      <p:sp>
+        <p:nvSpPr>
+          <p:cNvPr id="3" name="Notes Placeholder 2"/>
+          <p:cNvSpPr>
+            <a:spLocks noGrp="1"/>
+          </p:cNvSpPr>
+          <p:nvPr>
+            <p:ph type="body" idx="1"/>
+          </p:nvPr>
+        </p:nvSpPr>
+        <p:spPr/>
+        <p:txBody>
+          <a:bodyPr/>
+          <a:lstStyle/>
+          <a:p>
+            <a:endParaRPr lang="en-US" dirty="0"/>
+          </a:p>
+        </p:txBody>
+      </p:sp>
+      <p:sp>
+        <p:nvSpPr>
+          <p:cNvPr id="4" name="Slide Number Placeholder 3"/>
+          <p:cNvSpPr>
+            <a:spLocks noGrp="1"/>
+          </p:cNvSpPr>
+          <p:nvPr>
+            <p:ph type="sldNum" sz="quarter" idx="5"/>
+          </p:nvPr>
+        </p:nvSpPr>
+        <p:spPr/>
+        <p:txBody>
+          <a:bodyPr/>
+          <a:lstStyle/>
+          <a:p>
+            <a:fld id="{24E9AA13-E3FC-4BB6-B68D-5F0F5803D716}" type="slidenum">
+              <a:rPr lang="en-US" smtClean="0"/>
+              <a:t>5</a:t>
+            </a:fld>
+            <a:endParaRPr lang="en-US"/>
+          </a:p>
+        </p:txBody>
+      </p:sp>
+    </p:spTree>
+    <p:extLst>
+      <p:ext uri="{BB962C8B-B14F-4D97-AF65-F5344CB8AC3E}">
+        <p14:creationId xmlns:p14="http://schemas.microsoft.com/office/powerpoint/2010/main" val="876738265"/>
+      </p:ext>
+    </p:extLst>
+  </p:cSld>
+  <p:clrMapOvr>
+    <a:masterClrMapping/>
+  </p:clrMapOvr>
+</p:notes>
+</file>
+
+<file path=ppt/notesSlides/notesSlide2.xml><?xml version="1.0" encoding="utf-8"?>
+<p:notes xmlns:a="http://schemas.openxmlformats.org/drawingml/2006/main" xmlns:r="http://schemas.openxmlformats.org/officeDocument/2006/relationships" xmlns:p="http://schemas.openxmlformats.org/presentationml/2006/main">
+  <p:cSld>
+    <p:spTree>
+      <p:nvGrpSpPr>
+        <p:cNvPr id="1" name=""/>
+        <p:cNvGrpSpPr/>
+        <p:nvPr/>
+      </p:nvGrpSpPr>
+      <p:grpSpPr>
+        <a:xfrm>
+          <a:off x="0" y="0"/>
+          <a:ext cx="0" cy="0"/>
+          <a:chOff x="0" y="0"/>
+          <a:chExt cx="0" cy="0"/>
+        </a:xfrm>
+      </p:grpSpPr>
+      <p:sp>
+        <p:nvSpPr>
           <p:cNvPr id="79874" name="Slide Image Placeholder 1"/>
           <p:cNvSpPr>
             <a:spLocks noGrp="1" noRot="1" noChangeAspect="1" noTextEdit="1"/>
@@ -726,7 +810,7 @@
           <a:p>
             <a:fld id="{5738B90E-0779-4C36-915C-6F05FCD89456}" type="datetime1">
               <a:rPr lang="en-US" smtClean="0"/>
-              <a:t>10/26/20</a:t>
+              <a:t>3/22/21</a:t>
             </a:fld>
             <a:endParaRPr lang="en-US"/>
           </a:p>
@@ -944,7 +1028,7 @@
           <a:p>
             <a:fld id="{7B9EA29D-D431-42FE-B7B6-AAE4454C77D3}" type="datetime1">
               <a:rPr lang="en-US" smtClean="0"/>
-              <a:t>10/26/20</a:t>
+              <a:t>3/22/21</a:t>
             </a:fld>
             <a:endParaRPr lang="en-US"/>
           </a:p>
@@ -1204,7 +1288,7 @@
           <a:p>
             <a:fld id="{690D8A1E-EA8F-46C1-B891-AE0C00D9C314}" type="datetime1">
               <a:rPr lang="en-US" smtClean="0"/>
-              <a:t>10/26/20</a:t>
+              <a:t>3/22/21</a:t>
             </a:fld>
             <a:endParaRPr lang="en-US"/>
           </a:p>
@@ -1498,7 +1582,7 @@
           <a:p>
             <a:fld id="{D753EFC8-4232-4598-94F6-94C0EBAFC469}" type="datetime1">
               <a:rPr lang="en-US" smtClean="0"/>
-              <a:t>10/26/20</a:t>
+              <a:t>3/22/21</a:t>
             </a:fld>
             <a:endParaRPr lang="en-US"/>
           </a:p>
@@ -1813,7 +1897,7 @@
           <a:p>
             <a:fld id="{F3161074-1C18-4AE7-957D-F18524378C85}" type="datetime1">
               <a:rPr lang="en-US" smtClean="0"/>
-              <a:t>10/26/20</a:t>
+              <a:t>3/22/21</a:t>
             </a:fld>
             <a:endParaRPr lang="en-US"/>
           </a:p>
@@ -2087,7 +2171,7 @@
           <a:p>
             <a:fld id="{69BE256C-8D9A-4404-B47D-41A1AE514425}" type="datetime1">
               <a:rPr lang="en-US" smtClean="0"/>
-              <a:t>10/26/20</a:t>
+              <a:t>3/22/21</a:t>
             </a:fld>
             <a:endParaRPr lang="en-US"/>
           </a:p>
@@ -2521,7 +2605,7 @@
           <a:p>
             <a:fld id="{66CB2154-9035-4012-8189-BAAB61C5A5EE}" type="datetime1">
               <a:rPr lang="en-US" smtClean="0"/>
-              <a:t>10/26/20</a:t>
+              <a:t>3/22/21</a:t>
             </a:fld>
             <a:endParaRPr lang="en-US"/>
           </a:p>
@@ -2695,7 +2779,7 @@
           <a:p>
             <a:fld id="{6700A58B-DD98-43D0-B791-721480A02982}" type="datetime1">
               <a:rPr lang="en-US" smtClean="0"/>
-              <a:t>10/26/20</a:t>
+              <a:t>3/22/21</a:t>
             </a:fld>
             <a:endParaRPr lang="en-US"/>
           </a:p>
@@ -2887,7 +2971,7 @@
           <a:p>
             <a:fld id="{7DB6E382-4F61-4E24-BE1A-377EC83D0E3A}" type="datetime1">
               <a:rPr lang="en-US" smtClean="0"/>
-              <a:t>10/26/20</a:t>
+              <a:t>3/22/21</a:t>
             </a:fld>
             <a:endParaRPr lang="en-US"/>
           </a:p>
@@ -3198,7 +3282,7 @@
           <a:p>
             <a:fld id="{4142EED6-FC16-45B9-B8C4-2BC5DBA88325}" type="datetime1">
               <a:rPr lang="en-US" smtClean="0"/>
-              <a:t>10/26/20</a:t>
+              <a:t>3/22/21</a:t>
             </a:fld>
             <a:endParaRPr lang="en-US"/>
           </a:p>
@@ -3516,7 +3600,7 @@
           <a:p>
             <a:fld id="{DF59512B-4F1D-43D7-8819-2F53FEF69650}" type="datetime1">
               <a:rPr lang="en-US" smtClean="0"/>
-              <a:t>10/26/20</a:t>
+              <a:t>3/22/21</a:t>
             </a:fld>
             <a:endParaRPr lang="en-US"/>
           </a:p>
@@ -3792,7 +3876,7 @@
           <a:p>
             <a:fld id="{08437B94-E2BF-44DC-ADC5-B05FC9934E9D}" type="datetime1">
               <a:rPr lang="en-US" smtClean="0"/>
-              <a:t>10/26/20</a:t>
+              <a:t>3/22/21</a:t>
             </a:fld>
             <a:endParaRPr lang="en-US"/>
           </a:p>
@@ -4238,7 +4322,42 @@
       </p:grpSpPr>
       <p:sp>
         <p:nvSpPr>
-          <p:cNvPr id="2" name="Title 1"/>
+          <p:cNvPr id="2" name="Date Placeholder 1">
+            <a:extLst>
+              <a:ext uri="{FF2B5EF4-FFF2-40B4-BE49-F238E27FC236}">
+                <a16:creationId xmlns:a16="http://schemas.microsoft.com/office/drawing/2014/main" id="{5BA880B5-5AE1-467C-8366-3251D679BDF3}"/>
+              </a:ext>
+            </a:extLst>
+          </p:cNvPr>
+          <p:cNvSpPr>
+            <a:spLocks noGrp="1"/>
+          </p:cNvSpPr>
+          <p:nvPr>
+            <p:ph type="dt" sz="half" idx="10"/>
+          </p:nvPr>
+        </p:nvSpPr>
+        <p:spPr/>
+        <p:txBody>
+          <a:bodyPr/>
+          <a:lstStyle/>
+          <a:p>
+            <a:fld id="{6700A58B-DD98-43D0-B791-721480A02982}" type="datetime1">
+              <a:rPr lang="en-US" smtClean="0"/>
+              <a:t>3/22/21</a:t>
+            </a:fld>
+            <a:endParaRPr lang="en-US"/>
+          </a:p>
+        </p:txBody>
+      </p:sp>
+      <p:sp>
+        <p:nvSpPr>
+          <p:cNvPr id="3" name="Title 2">
+            <a:extLst>
+              <a:ext uri="{FF2B5EF4-FFF2-40B4-BE49-F238E27FC236}">
+                <a16:creationId xmlns:a16="http://schemas.microsoft.com/office/drawing/2014/main" id="{49163186-DB36-4EF5-9068-974F89000C74}"/>
+              </a:ext>
+            </a:extLst>
+          </p:cNvPr>
           <p:cNvSpPr>
             <a:spLocks noGrp="1"/>
           </p:cNvSpPr>
@@ -4253,396 +4372,25 @@
           <a:p>
             <a:r>
               <a:rPr lang="en-US" dirty="0"/>
-              <a:t>Agenda</a:t>
+              <a:t>The Wisdom of the Crowd</a:t>
             </a:r>
           </a:p>
         </p:txBody>
       </p:sp>
-      <p:graphicFrame>
-        <p:nvGraphicFramePr>
-          <p:cNvPr id="4" name="Content Placeholder 3"/>
-          <p:cNvGraphicFramePr>
-            <a:graphicFrameLocks noGrp="1"/>
-          </p:cNvGraphicFramePr>
-          <p:nvPr>
-            <p:ph idx="1"/>
-          </p:nvPr>
-        </p:nvGraphicFramePr>
-        <p:xfrm>
-          <a:off x="614363" y="1111250"/>
-          <a:ext cx="7915275" cy="2377440"/>
-        </p:xfrm>
-        <a:graphic>
-          <a:graphicData uri="http://schemas.openxmlformats.org/drawingml/2006/table">
-            <a:tbl>
-              <a:tblPr firstRow="1" bandRow="1">
-                <a:tableStyleId>{F5AB1C69-6EDB-4FF4-983F-18BD219EF322}</a:tableStyleId>
-              </a:tblPr>
-              <a:tblGrid>
-                <a:gridCol w="1242805">
-                  <a:extLst>
-                    <a:ext uri="{9D8B030D-6E8A-4147-A177-3AD203B41FA5}">
-                      <a16:colId xmlns:a16="http://schemas.microsoft.com/office/drawing/2014/main" val="20000"/>
-                    </a:ext>
-                  </a:extLst>
-                </a:gridCol>
-                <a:gridCol w="861296">
-                  <a:extLst>
-                    <a:ext uri="{9D8B030D-6E8A-4147-A177-3AD203B41FA5}">
-                      <a16:colId xmlns:a16="http://schemas.microsoft.com/office/drawing/2014/main" val="20001"/>
-                    </a:ext>
-                  </a:extLst>
-                </a:gridCol>
-                <a:gridCol w="5811174">
-                  <a:extLst>
-                    <a:ext uri="{9D8B030D-6E8A-4147-A177-3AD203B41FA5}">
-                      <a16:colId xmlns:a16="http://schemas.microsoft.com/office/drawing/2014/main" val="20002"/>
-                    </a:ext>
-                  </a:extLst>
-                </a:gridCol>
-              </a:tblGrid>
-              <a:tr h="370840">
-                <a:tc>
-                  <a:txBody>
-                    <a:bodyPr/>
-                    <a:lstStyle/>
-                    <a:p>
-                      <a:pPr algn="ctr"/>
-                      <a:r>
-                        <a:rPr lang="en-US" sz="2000" b="0" strike="noStrike" dirty="0">
-                          <a:solidFill>
-                            <a:schemeClr val="bg1"/>
-                          </a:solidFill>
-                        </a:rPr>
-                        <a:t>Start</a:t>
-                      </a:r>
-                    </a:p>
-                  </a:txBody>
-                  <a:tcPr/>
-                </a:tc>
-                <a:tc>
-                  <a:txBody>
-                    <a:bodyPr/>
-                    <a:lstStyle/>
-                    <a:p>
-                      <a:pPr algn="ctr"/>
-                      <a:r>
-                        <a:rPr lang="en-US" sz="2000" b="0" strike="noStrike" dirty="0">
-                          <a:solidFill>
-                            <a:schemeClr val="bg1"/>
-                          </a:solidFill>
-                        </a:rPr>
-                        <a:t>End</a:t>
-                      </a:r>
-                    </a:p>
-                  </a:txBody>
-                  <a:tcPr/>
-                </a:tc>
-                <a:tc>
-                  <a:txBody>
-                    <a:bodyPr/>
-                    <a:lstStyle/>
-                    <a:p>
-                      <a:r>
-                        <a:rPr lang="en-US" sz="2000" b="0" strike="noStrike" dirty="0">
-                          <a:solidFill>
-                            <a:schemeClr val="bg1"/>
-                          </a:solidFill>
-                        </a:rPr>
-                        <a:t>Item</a:t>
-                      </a:r>
-                    </a:p>
-                  </a:txBody>
-                  <a:tcPr/>
-                </a:tc>
-                <a:extLst>
-                  <a:ext uri="{0D108BD9-81ED-4DB2-BD59-A6C34878D82A}">
-                    <a16:rowId xmlns:a16="http://schemas.microsoft.com/office/drawing/2014/main" val="10000"/>
-                  </a:ext>
-                </a:extLst>
-              </a:tr>
-              <a:tr h="370840">
-                <a:tc>
-                  <a:txBody>
-                    <a:bodyPr/>
-                    <a:lstStyle/>
-                    <a:p>
-                      <a:pPr algn="ctr"/>
-                      <a:endParaRPr lang="en-US" sz="2000" b="0" strike="noStrike" dirty="0">
-                        <a:solidFill>
-                          <a:schemeClr val="tx1"/>
-                        </a:solidFill>
-                      </a:endParaRPr>
-                    </a:p>
-                  </a:txBody>
-                  <a:tcPr/>
-                </a:tc>
-                <a:tc>
-                  <a:txBody>
-                    <a:bodyPr/>
-                    <a:lstStyle/>
-                    <a:p>
-                      <a:pPr algn="ctr"/>
-                      <a:endParaRPr lang="en-US" sz="2000" b="0" strike="noStrike" dirty="0">
-                        <a:solidFill>
-                          <a:schemeClr val="tx1"/>
-                        </a:solidFill>
-                      </a:endParaRPr>
-                    </a:p>
-                  </a:txBody>
-                  <a:tcPr/>
-                </a:tc>
-                <a:tc>
-                  <a:txBody>
-                    <a:bodyPr/>
-                    <a:lstStyle/>
-                    <a:p>
-                      <a:r>
-                        <a:rPr lang="en-US" sz="2000" b="0" strike="noStrike" dirty="0">
-                          <a:solidFill>
-                            <a:schemeClr val="tx1"/>
-                          </a:solidFill>
-                        </a:rPr>
-                        <a:t>Decision Trees - explanation</a:t>
-                      </a:r>
-                    </a:p>
-                  </a:txBody>
-                  <a:tcPr/>
-                </a:tc>
-                <a:extLst>
-                  <a:ext uri="{0D108BD9-81ED-4DB2-BD59-A6C34878D82A}">
-                    <a16:rowId xmlns:a16="http://schemas.microsoft.com/office/drawing/2014/main" val="3086568558"/>
-                  </a:ext>
-                </a:extLst>
-              </a:tr>
-              <a:tr h="370840">
-                <a:tc>
-                  <a:txBody>
-                    <a:bodyPr/>
-                    <a:lstStyle/>
-                    <a:p>
-                      <a:pPr algn="ctr"/>
-                      <a:endParaRPr lang="en-US" sz="2000" b="0" strike="noStrike" dirty="0">
-                        <a:solidFill>
-                          <a:schemeClr val="tx1"/>
-                        </a:solidFill>
-                      </a:endParaRPr>
-                    </a:p>
-                  </a:txBody>
-                  <a:tcPr/>
-                </a:tc>
-                <a:tc>
-                  <a:txBody>
-                    <a:bodyPr/>
-                    <a:lstStyle/>
-                    <a:p>
-                      <a:pPr algn="ctr"/>
-                      <a:endParaRPr lang="en-US" sz="2000" b="0" strike="noStrike" dirty="0">
-                        <a:solidFill>
-                          <a:schemeClr val="tx1"/>
-                        </a:solidFill>
-                      </a:endParaRPr>
-                    </a:p>
-                  </a:txBody>
-                  <a:tcPr/>
-                </a:tc>
-                <a:tc>
-                  <a:txBody>
-                    <a:bodyPr/>
-                    <a:lstStyle/>
-                    <a:p>
-                      <a:r>
-                        <a:rPr lang="en-US" sz="2000" b="0" strike="noStrike" dirty="0">
-                          <a:solidFill>
-                            <a:schemeClr val="tx1"/>
-                          </a:solidFill>
-                        </a:rPr>
-                        <a:t>Decision Tree Example</a:t>
-                      </a:r>
-                    </a:p>
-                  </a:txBody>
-                  <a:tcPr/>
-                </a:tc>
-                <a:extLst>
-                  <a:ext uri="{0D108BD9-81ED-4DB2-BD59-A6C34878D82A}">
-                    <a16:rowId xmlns:a16="http://schemas.microsoft.com/office/drawing/2014/main" val="1739476882"/>
-                  </a:ext>
-                </a:extLst>
-              </a:tr>
-              <a:tr h="370840">
-                <a:tc>
-                  <a:txBody>
-                    <a:bodyPr/>
-                    <a:lstStyle/>
-                    <a:p>
-                      <a:pPr algn="ctr"/>
-                      <a:endParaRPr lang="en-US" sz="2000" b="0" strike="noStrike" dirty="0">
-                        <a:solidFill>
-                          <a:schemeClr val="tx1"/>
-                        </a:solidFill>
-                      </a:endParaRPr>
-                    </a:p>
-                  </a:txBody>
-                  <a:tcPr/>
-                </a:tc>
-                <a:tc>
-                  <a:txBody>
-                    <a:bodyPr/>
-                    <a:lstStyle/>
-                    <a:p>
-                      <a:pPr algn="ctr"/>
-                      <a:endParaRPr lang="en-US" sz="2000" b="0" strike="noStrike" dirty="0">
-                        <a:solidFill>
-                          <a:schemeClr val="tx1"/>
-                        </a:solidFill>
-                      </a:endParaRPr>
-                    </a:p>
-                  </a:txBody>
-                  <a:tcPr/>
-                </a:tc>
-                <a:tc>
-                  <a:txBody>
-                    <a:bodyPr/>
-                    <a:lstStyle/>
-                    <a:p>
-                      <a:r>
-                        <a:rPr lang="en-US" sz="2000" b="0" strike="noStrike" dirty="0">
-                          <a:solidFill>
-                            <a:schemeClr val="tx1"/>
-                          </a:solidFill>
-                        </a:rPr>
-                        <a:t>A to Z Decision Trees scripting example</a:t>
-                      </a:r>
-                    </a:p>
-                  </a:txBody>
-                  <a:tcPr/>
-                </a:tc>
-                <a:extLst>
-                  <a:ext uri="{0D108BD9-81ED-4DB2-BD59-A6C34878D82A}">
-                    <a16:rowId xmlns:a16="http://schemas.microsoft.com/office/drawing/2014/main" val="4176223156"/>
-                  </a:ext>
-                </a:extLst>
-              </a:tr>
-              <a:tr h="370840">
-                <a:tc>
-                  <a:txBody>
-                    <a:bodyPr/>
-                    <a:lstStyle/>
-                    <a:p>
-                      <a:pPr algn="ctr"/>
-                      <a:endParaRPr lang="en-US" sz="2000" b="0" strike="noStrike" dirty="0">
-                        <a:solidFill>
-                          <a:schemeClr val="tx1"/>
-                        </a:solidFill>
-                      </a:endParaRPr>
-                    </a:p>
-                  </a:txBody>
-                  <a:tcPr/>
-                </a:tc>
-                <a:tc>
-                  <a:txBody>
-                    <a:bodyPr/>
-                    <a:lstStyle/>
-                    <a:p>
-                      <a:pPr algn="ctr"/>
-                      <a:endParaRPr lang="en-US" sz="2000" b="0" strike="noStrike" dirty="0">
-                        <a:solidFill>
-                          <a:schemeClr val="tx1"/>
-                        </a:solidFill>
-                      </a:endParaRPr>
-                    </a:p>
-                  </a:txBody>
-                  <a:tcPr/>
-                </a:tc>
-                <a:tc>
-                  <a:txBody>
-                    <a:bodyPr/>
-                    <a:lstStyle/>
-                    <a:p>
-                      <a:r>
-                        <a:rPr lang="en-US" sz="2000" b="0" strike="noStrike" dirty="0">
-                          <a:solidFill>
-                            <a:schemeClr val="tx1"/>
-                          </a:solidFill>
-                        </a:rPr>
-                        <a:t>Break</a:t>
-                      </a:r>
-                    </a:p>
-                  </a:txBody>
-                  <a:tcPr/>
-                </a:tc>
-                <a:extLst>
-                  <a:ext uri="{0D108BD9-81ED-4DB2-BD59-A6C34878D82A}">
-                    <a16:rowId xmlns:a16="http://schemas.microsoft.com/office/drawing/2014/main" val="375788903"/>
-                  </a:ext>
-                </a:extLst>
-              </a:tr>
-              <a:tr h="370840">
-                <a:tc>
-                  <a:txBody>
-                    <a:bodyPr/>
-                    <a:lstStyle/>
-                    <a:p>
-                      <a:pPr algn="ctr"/>
-                      <a:endParaRPr lang="en-US" sz="2000" b="0" strike="noStrike" dirty="0">
-                        <a:solidFill>
-                          <a:schemeClr val="tx1"/>
-                        </a:solidFill>
-                      </a:endParaRPr>
-                    </a:p>
-                  </a:txBody>
-                  <a:tcPr/>
-                </a:tc>
-                <a:tc>
-                  <a:txBody>
-                    <a:bodyPr/>
-                    <a:lstStyle/>
-                    <a:p>
-                      <a:pPr algn="ctr"/>
-                      <a:endParaRPr lang="en-US" sz="2000" b="0" strike="noStrike" dirty="0">
-                        <a:solidFill>
-                          <a:schemeClr val="tx1"/>
-                        </a:solidFill>
-                      </a:endParaRPr>
-                    </a:p>
-                  </a:txBody>
-                  <a:tcPr/>
-                </a:tc>
-                <a:tc>
-                  <a:txBody>
-                    <a:bodyPr/>
-                    <a:lstStyle/>
-                    <a:p>
-                      <a:r>
-                        <a:rPr lang="en-US" sz="2000" b="0" strike="noStrike" dirty="0">
-                          <a:solidFill>
-                            <a:schemeClr val="tx1"/>
-                          </a:solidFill>
-                        </a:rPr>
-                        <a:t>Random Forests</a:t>
-                      </a:r>
-                    </a:p>
-                  </a:txBody>
-                  <a:tcPr/>
-                </a:tc>
-                <a:extLst>
-                  <a:ext uri="{0D108BD9-81ED-4DB2-BD59-A6C34878D82A}">
-                    <a16:rowId xmlns:a16="http://schemas.microsoft.com/office/drawing/2014/main" val="1479263652"/>
-                  </a:ext>
-                </a:extLst>
-              </a:tr>
-            </a:tbl>
-          </a:graphicData>
-        </a:graphic>
-      </p:graphicFrame>
       <p:sp>
         <p:nvSpPr>
-          <p:cNvPr id="5" name="Date Placeholder 4"/>
+          <p:cNvPr id="4" name="Slide Number Placeholder 3">
+            <a:extLst>
+              <a:ext uri="{FF2B5EF4-FFF2-40B4-BE49-F238E27FC236}">
+                <a16:creationId xmlns:a16="http://schemas.microsoft.com/office/drawing/2014/main" id="{FDD3217C-CD88-432D-8A68-B1DF66C148B8}"/>
+              </a:ext>
+            </a:extLst>
+          </p:cNvPr>
           <p:cNvSpPr>
             <a:spLocks noGrp="1"/>
           </p:cNvSpPr>
           <p:nvPr>
-            <p:ph type="dt" sz="half" idx="10"/>
+            <p:ph type="sldNum" sz="quarter" idx="12"/>
           </p:nvPr>
         </p:nvSpPr>
         <p:spPr/>
@@ -4650,9 +4398,9 @@
           <a:bodyPr/>
           <a:lstStyle/>
           <a:p>
-            <a:fld id="{9B19E99B-5349-415A-8E56-8E989211A366}" type="datetime1">
+            <a:fld id="{37290FF7-652B-4475-AEAB-8B1A5D23AE09}" type="slidenum">
               <a:rPr lang="en-US" smtClean="0"/>
-              <a:t>10/26/20</a:t>
+              <a:t>1</a:t>
             </a:fld>
             <a:endParaRPr lang="en-US"/>
           </a:p>
@@ -4660,7 +4408,13 @@
       </p:sp>
       <p:sp>
         <p:nvSpPr>
-          <p:cNvPr id="6" name="Footer Placeholder 5"/>
+          <p:cNvPr id="5" name="Footer Placeholder 4">
+            <a:extLst>
+              <a:ext uri="{FF2B5EF4-FFF2-40B4-BE49-F238E27FC236}">
+                <a16:creationId xmlns:a16="http://schemas.microsoft.com/office/drawing/2014/main" id="{ABC36FE1-87DF-43B7-B607-7E8223A9BBD7}"/>
+              </a:ext>
+            </a:extLst>
+          </p:cNvPr>
           <p:cNvSpPr>
             <a:spLocks noGrp="1"/>
           </p:cNvSpPr>
@@ -4682,31 +4436,61 @@
       </p:sp>
       <p:sp>
         <p:nvSpPr>
-          <p:cNvPr id="7" name="Slide Number Placeholder 6"/>
-          <p:cNvSpPr>
-            <a:spLocks noGrp="1"/>
-          </p:cNvSpPr>
-          <p:nvPr>
-            <p:ph type="sldNum" sz="quarter" idx="12"/>
-          </p:nvPr>
+          <p:cNvPr id="6" name="Shape 651">
+            <a:extLst>
+              <a:ext uri="{FF2B5EF4-FFF2-40B4-BE49-F238E27FC236}">
+                <a16:creationId xmlns:a16="http://schemas.microsoft.com/office/drawing/2014/main" id="{FD924FEC-E4D2-4DCA-8439-16F154EFDFAE}"/>
+              </a:ext>
+            </a:extLst>
+          </p:cNvPr>
+          <p:cNvSpPr txBox="1"/>
+          <p:nvPr/>
         </p:nvSpPr>
-        <p:spPr/>
+        <p:spPr>
+          <a:xfrm>
+            <a:off x="304799" y="3093720"/>
+            <a:ext cx="8729546" cy="754799"/>
+          </a:xfrm>
+          <a:prstGeom prst="rect">
+            <a:avLst/>
+          </a:prstGeom>
+          <a:solidFill>
+            <a:schemeClr val="accent5"/>
+          </a:solidFill>
+          <a:ln>
+            <a:noFill/>
+          </a:ln>
+        </p:spPr>
         <p:txBody>
-          <a:bodyPr/>
+          <a:bodyPr lIns="91425" tIns="91425" rIns="91425" bIns="91425" anchor="ctr" anchorCtr="0">
+            <a:noAutofit/>
+          </a:bodyPr>
           <a:lstStyle/>
           <a:p>
-            <a:fld id="{37290FF7-652B-4475-AEAB-8B1A5D23AE09}" type="slidenum">
-              <a:rPr lang="en-US" smtClean="0"/>
-              <a:t>1</a:t>
-            </a:fld>
-            <a:endParaRPr lang="en-US"/>
+            <a:pPr algn="ctr">
+              <a:lnSpc>
+                <a:spcPct val="115000"/>
+              </a:lnSpc>
+            </a:pPr>
+            <a:r>
+              <a:rPr lang="en" sz="1600" dirty="0">
+                <a:solidFill>
+                  <a:srgbClr val="FFFFFF"/>
+                </a:solidFill>
+                <a:latin typeface="Open Sans"/>
+                <a:ea typeface="Open Sans"/>
+                <a:cs typeface="Open Sans"/>
+                <a:sym typeface="Open Sans"/>
+              </a:rPr>
+              <a:t>1907 Vox Populi by Sir Francis Galton created the notion of  “wisdom of crowds” as a phenomenon.  It is the basis of modern search engines and crowdsourcing.</a:t>
+            </a:r>
           </a:p>
         </p:txBody>
       </p:sp>
     </p:spTree>
     <p:extLst>
       <p:ext uri="{BB962C8B-B14F-4D97-AF65-F5344CB8AC3E}">
-        <p14:creationId xmlns:p14="http://schemas.microsoft.com/office/powerpoint/2010/main" val="3830336220"/>
+        <p14:creationId xmlns:p14="http://schemas.microsoft.com/office/powerpoint/2010/main" val="3403927038"/>
       </p:ext>
     </p:extLst>
   </p:cSld>
@@ -4750,7 +4534,7 @@
           <a:p>
             <a:fld id="{6700A58B-DD98-43D0-B791-721480A02982}" type="datetime1">
               <a:rPr lang="en-US" smtClean="0"/>
-              <a:t>10/26/20</a:t>
+              <a:t>3/22/21</a:t>
             </a:fld>
             <a:endParaRPr lang="en-US"/>
           </a:p>
@@ -5507,7 +5291,7 @@
           <a:p>
             <a:fld id="{6700A58B-DD98-43D0-B791-721480A02982}" type="datetime1">
               <a:rPr lang="en-US" smtClean="0"/>
-              <a:t>10/26/20</a:t>
+              <a:t>3/22/21</a:t>
             </a:fld>
             <a:endParaRPr lang="en-US"/>
           </a:p>
@@ -5536,7 +5320,7 @@
           <a:p>
             <a:r>
               <a:rPr lang="en-US" dirty="0"/>
-              <a:t>Random Forests…the Wisdom of the Crowd</a:t>
+              <a:t>The Wisdom of the Crowd</a:t>
             </a:r>
           </a:p>
         </p:txBody>
@@ -5594,59 +5378,6 @@
             <a:r>
               <a:rPr lang="en-US" dirty="0"/>
               <a:t>Kwartler CSCI -96</a:t>
-            </a:r>
-          </a:p>
-        </p:txBody>
-      </p:sp>
-      <p:sp>
-        <p:nvSpPr>
-          <p:cNvPr id="6" name="Shape 651">
-            <a:extLst>
-              <a:ext uri="{FF2B5EF4-FFF2-40B4-BE49-F238E27FC236}">
-                <a16:creationId xmlns:a16="http://schemas.microsoft.com/office/drawing/2014/main" id="{FD924FEC-E4D2-4DCA-8439-16F154EFDFAE}"/>
-              </a:ext>
-            </a:extLst>
-          </p:cNvPr>
-          <p:cNvSpPr txBox="1"/>
-          <p:nvPr/>
-        </p:nvSpPr>
-        <p:spPr>
-          <a:xfrm>
-            <a:off x="304799" y="1143000"/>
-            <a:ext cx="8729546" cy="754799"/>
-          </a:xfrm>
-          <a:prstGeom prst="rect">
-            <a:avLst/>
-          </a:prstGeom>
-          <a:solidFill>
-            <a:schemeClr val="accent5"/>
-          </a:solidFill>
-          <a:ln>
-            <a:noFill/>
-          </a:ln>
-        </p:spPr>
-        <p:txBody>
-          <a:bodyPr lIns="91425" tIns="91425" rIns="91425" bIns="91425" anchor="ctr" anchorCtr="0">
-            <a:noAutofit/>
-          </a:bodyPr>
-          <a:lstStyle/>
-          <a:p>
-            <a:pPr algn="ctr">
-              <a:lnSpc>
-                <a:spcPct val="115000"/>
-              </a:lnSpc>
-            </a:pPr>
-            <a:r>
-              <a:rPr lang="en" sz="1600" dirty="0">
-                <a:solidFill>
-                  <a:srgbClr val="FFFFFF"/>
-                </a:solidFill>
-                <a:latin typeface="Open Sans"/>
-                <a:ea typeface="Open Sans"/>
-                <a:cs typeface="Open Sans"/>
-                <a:sym typeface="Open Sans"/>
-              </a:rPr>
-              <a:t>1907 Vox Populi by Sir Francis Galton created the notion of  “wisdom of crowds” as a phenomenon.  It is the basis of modern search engines and crowdsourcing.</a:t>
             </a:r>
           </a:p>
         </p:txBody>
@@ -5794,7 +5525,7 @@
         </p:blipFill>
         <p:spPr>
           <a:xfrm>
-            <a:off x="5638800" y="2096413"/>
+            <a:off x="5562600" y="1716750"/>
             <a:ext cx="3160925" cy="3314575"/>
           </a:xfrm>
           <a:prstGeom prst="rect">
@@ -5822,7 +5553,7 @@
         </p:nvSpPr>
         <p:spPr>
           <a:xfrm>
-            <a:off x="304799" y="2073573"/>
+            <a:off x="228599" y="1716750"/>
             <a:ext cx="4343401" cy="3424499"/>
           </a:xfrm>
           <a:prstGeom prst="rect">
@@ -6000,13 +5731,137 @@
     </p:spTree>
     <p:extLst>
       <p:ext uri="{BB962C8B-B14F-4D97-AF65-F5344CB8AC3E}">
-        <p14:creationId xmlns:p14="http://schemas.microsoft.com/office/powerpoint/2010/main" val="3403927038"/>
+        <p14:creationId xmlns:p14="http://schemas.microsoft.com/office/powerpoint/2010/main" val="2316146822"/>
       </p:ext>
     </p:extLst>
   </p:cSld>
   <p:clrMapOvr>
     <a:masterClrMapping/>
   </p:clrMapOvr>
+  <p:timing>
+    <p:tnLst>
+      <p:par>
+        <p:cTn id="1" dur="indefinite" restart="never" nodeType="tmRoot">
+          <p:childTnLst>
+            <p:seq concurrent="1" nextAc="seek">
+              <p:cTn id="2" dur="indefinite" nodeType="mainSeq">
+                <p:childTnLst>
+                  <p:par>
+                    <p:cTn id="3" fill="hold">
+                      <p:stCondLst>
+                        <p:cond delay="indefinite"/>
+                      </p:stCondLst>
+                      <p:childTnLst>
+                        <p:par>
+                          <p:cTn id="4" fill="hold">
+                            <p:stCondLst>
+                              <p:cond delay="0"/>
+                            </p:stCondLst>
+                            <p:childTnLst>
+                              <p:par>
+                                <p:cTn id="5" presetID="1" presetClass="entr" presetSubtype="0" fill="hold" grpId="0" nodeType="clickEffect">
+                                  <p:stCondLst>
+                                    <p:cond delay="0"/>
+                                  </p:stCondLst>
+                                  <p:childTnLst>
+                                    <p:set>
+                                      <p:cBhvr>
+                                        <p:cTn id="6" dur="1" fill="hold">
+                                          <p:stCondLst>
+                                            <p:cond delay="0"/>
+                                          </p:stCondLst>
+                                        </p:cTn>
+                                        <p:tgtEl>
+                                          <p:spTgt spid="9"/>
+                                        </p:tgtEl>
+                                        <p:attrNameLst>
+                                          <p:attrName>style.visibility</p:attrName>
+                                        </p:attrNameLst>
+                                      </p:cBhvr>
+                                      <p:to>
+                                        <p:strVal val="visible"/>
+                                      </p:to>
+                                    </p:set>
+                                  </p:childTnLst>
+                                </p:cTn>
+                              </p:par>
+                            </p:childTnLst>
+                          </p:cTn>
+                        </p:par>
+                      </p:childTnLst>
+                    </p:cTn>
+                  </p:par>
+                  <p:par>
+                    <p:cTn id="7" fill="hold">
+                      <p:stCondLst>
+                        <p:cond delay="indefinite"/>
+                      </p:stCondLst>
+                      <p:childTnLst>
+                        <p:par>
+                          <p:cTn id="8" fill="hold">
+                            <p:stCondLst>
+                              <p:cond delay="0"/>
+                            </p:stCondLst>
+                            <p:childTnLst>
+                              <p:par>
+                                <p:cTn id="9" presetID="1" presetClass="entr" presetSubtype="0" fill="hold" grpId="0" nodeType="clickEffect">
+                                  <p:stCondLst>
+                                    <p:cond delay="0"/>
+                                  </p:stCondLst>
+                                  <p:childTnLst>
+                                    <p:set>
+                                      <p:cBhvr>
+                                        <p:cTn id="10" dur="1" fill="hold">
+                                          <p:stCondLst>
+                                            <p:cond delay="0"/>
+                                          </p:stCondLst>
+                                        </p:cTn>
+                                        <p:tgtEl>
+                                          <p:spTgt spid="7"/>
+                                        </p:tgtEl>
+                                        <p:attrNameLst>
+                                          <p:attrName>style.visibility</p:attrName>
+                                        </p:attrNameLst>
+                                      </p:cBhvr>
+                                      <p:to>
+                                        <p:strVal val="visible"/>
+                                      </p:to>
+                                    </p:set>
+                                  </p:childTnLst>
+                                </p:cTn>
+                              </p:par>
+                            </p:childTnLst>
+                          </p:cTn>
+                        </p:par>
+                      </p:childTnLst>
+                    </p:cTn>
+                  </p:par>
+                </p:childTnLst>
+              </p:cTn>
+              <p:prevCondLst>
+                <p:cond evt="onPrev" delay="0">
+                  <p:tgtEl>
+                    <p:sldTgt/>
+                  </p:tgtEl>
+                </p:cond>
+              </p:prevCondLst>
+              <p:nextCondLst>
+                <p:cond evt="onNext" delay="0">
+                  <p:tgtEl>
+                    <p:sldTgt/>
+                  </p:tgtEl>
+                </p:cond>
+              </p:nextCondLst>
+            </p:seq>
+          </p:childTnLst>
+        </p:cTn>
+      </p:par>
+    </p:tnLst>
+    <p:bldLst>
+      <p:bldP spid="7" grpId="0" animBg="1"/>
+      <p:bldP spid="9" grpId="0"/>
+    </p:bldLst>
+  </p:timing>
 </p:sld>
 </file>
 
@@ -6050,7 +5905,7 @@
           <a:p>
             <a:fld id="{6700A58B-DD98-43D0-B791-721480A02982}" type="datetime1">
               <a:rPr lang="en-US" smtClean="0"/>
-              <a:t>10/26/20</a:t>
+              <a:t>3/22/21</a:t>
             </a:fld>
             <a:endParaRPr lang="en-US"/>
           </a:p>
@@ -6523,6 +6378,130 @@
   <p:clrMapOvr>
     <a:masterClrMapping/>
   </p:clrMapOvr>
+  <p:timing>
+    <p:tnLst>
+      <p:par>
+        <p:cTn id="1" dur="indefinite" restart="never" nodeType="tmRoot">
+          <p:childTnLst>
+            <p:seq concurrent="1" nextAc="seek">
+              <p:cTn id="2" dur="indefinite" nodeType="mainSeq">
+                <p:childTnLst>
+                  <p:par>
+                    <p:cTn id="3" fill="hold">
+                      <p:stCondLst>
+                        <p:cond delay="indefinite"/>
+                      </p:stCondLst>
+                      <p:childTnLst>
+                        <p:par>
+                          <p:cTn id="4" fill="hold">
+                            <p:stCondLst>
+                              <p:cond delay="0"/>
+                            </p:stCondLst>
+                            <p:childTnLst>
+                              <p:par>
+                                <p:cTn id="5" presetID="1" presetClass="entr" presetSubtype="0" fill="hold" grpId="0" nodeType="clickEffect">
+                                  <p:stCondLst>
+                                    <p:cond delay="0"/>
+                                  </p:stCondLst>
+                                  <p:childTnLst>
+                                    <p:set>
+                                      <p:cBhvr>
+                                        <p:cTn id="6" dur="1" fill="hold">
+                                          <p:stCondLst>
+                                            <p:cond delay="0"/>
+                                          </p:stCondLst>
+                                        </p:cTn>
+                                        <p:tgtEl>
+                                          <p:spTgt spid="10"/>
+                                        </p:tgtEl>
+                                        <p:attrNameLst>
+                                          <p:attrName>style.visibility</p:attrName>
+                                        </p:attrNameLst>
+                                      </p:cBhvr>
+                                      <p:to>
+                                        <p:strVal val="visible"/>
+                                      </p:to>
+                                    </p:set>
+                                  </p:childTnLst>
+                                </p:cTn>
+                              </p:par>
+                            </p:childTnLst>
+                          </p:cTn>
+                        </p:par>
+                      </p:childTnLst>
+                    </p:cTn>
+                  </p:par>
+                  <p:par>
+                    <p:cTn id="7" fill="hold">
+                      <p:stCondLst>
+                        <p:cond delay="indefinite"/>
+                      </p:stCondLst>
+                      <p:childTnLst>
+                        <p:par>
+                          <p:cTn id="8" fill="hold">
+                            <p:stCondLst>
+                              <p:cond delay="0"/>
+                            </p:stCondLst>
+                            <p:childTnLst>
+                              <p:par>
+                                <p:cTn id="9" presetID="1" presetClass="entr" presetSubtype="0" fill="hold" grpId="0" nodeType="clickEffect">
+                                  <p:stCondLst>
+                                    <p:cond delay="0"/>
+                                  </p:stCondLst>
+                                  <p:childTnLst>
+                                    <p:set>
+                                      <p:cBhvr>
+                                        <p:cTn id="10" dur="1" fill="hold">
+                                          <p:stCondLst>
+                                            <p:cond delay="0"/>
+                                          </p:stCondLst>
+                                        </p:cTn>
+                                        <p:tgtEl>
+                                          <p:spTgt spid="11"/>
+                                        </p:tgtEl>
+                                        <p:attrNameLst>
+                                          <p:attrName>style.visibility</p:attrName>
+                                        </p:attrNameLst>
+                                      </p:cBhvr>
+                                      <p:to>
+                                        <p:strVal val="visible"/>
+                                      </p:to>
+                                    </p:set>
+                                  </p:childTnLst>
+                                </p:cTn>
+                              </p:par>
+                            </p:childTnLst>
+                          </p:cTn>
+                        </p:par>
+                      </p:childTnLst>
+                    </p:cTn>
+                  </p:par>
+                </p:childTnLst>
+              </p:cTn>
+              <p:prevCondLst>
+                <p:cond evt="onPrev" delay="0">
+                  <p:tgtEl>
+                    <p:sldTgt/>
+                  </p:tgtEl>
+                </p:cond>
+              </p:prevCondLst>
+              <p:nextCondLst>
+                <p:cond evt="onNext" delay="0">
+                  <p:tgtEl>
+                    <p:sldTgt/>
+                  </p:tgtEl>
+                </p:cond>
+              </p:nextCondLst>
+            </p:seq>
+          </p:childTnLst>
+        </p:cTn>
+      </p:par>
+    </p:tnLst>
+    <p:bldLst>
+      <p:bldP spid="10" grpId="0"/>
+      <p:bldP spid="11" grpId="0"/>
+    </p:bldLst>
+  </p:timing>
 </p:sld>
 </file>
 
@@ -6621,7 +6600,7 @@
           <a:p>
             <a:fld id="{6700A58B-DD98-43D0-B791-721480A02982}" type="datetime1">
               <a:rPr lang="en-US" smtClean="0"/>
-              <a:t>10/26/20</a:t>
+              <a:t>3/22/21</a:t>
             </a:fld>
             <a:endParaRPr lang="en-US"/>
           </a:p>
@@ -9654,6 +9633,111 @@
   <p:clrMapOvr>
     <a:masterClrMapping/>
   </p:clrMapOvr>
+  <p:timing>
+    <p:tnLst>
+      <p:par>
+        <p:cTn id="1" dur="indefinite" restart="never" nodeType="tmRoot">
+          <p:childTnLst>
+            <p:seq concurrent="1" nextAc="seek">
+              <p:cTn id="2" dur="indefinite" nodeType="mainSeq">
+                <p:childTnLst>
+                  <p:par>
+                    <p:cTn id="3" fill="hold">
+                      <p:stCondLst>
+                        <p:cond delay="indefinite"/>
+                      </p:stCondLst>
+                      <p:childTnLst>
+                        <p:par>
+                          <p:cTn id="4" fill="hold">
+                            <p:stCondLst>
+                              <p:cond delay="0"/>
+                            </p:stCondLst>
+                            <p:childTnLst>
+                              <p:par>
+                                <p:cTn id="5" presetID="1" presetClass="entr" presetSubtype="0" fill="hold" grpId="0" nodeType="clickEffect">
+                                  <p:stCondLst>
+                                    <p:cond delay="0"/>
+                                  </p:stCondLst>
+                                  <p:childTnLst>
+                                    <p:set>
+                                      <p:cBhvr>
+                                        <p:cTn id="6" dur="1" fill="hold">
+                                          <p:stCondLst>
+                                            <p:cond delay="0"/>
+                                          </p:stCondLst>
+                                        </p:cTn>
+                                        <p:tgtEl>
+                                          <p:spTgt spid="9"/>
+                                        </p:tgtEl>
+                                        <p:attrNameLst>
+                                          <p:attrName>style.visibility</p:attrName>
+                                        </p:attrNameLst>
+                                      </p:cBhvr>
+                                      <p:to>
+                                        <p:strVal val="visible"/>
+                                      </p:to>
+                                    </p:set>
+                                  </p:childTnLst>
+                                </p:cTn>
+                              </p:par>
+                              <p:par>
+                                <p:cTn id="7" presetID="1" presetClass="entr" presetSubtype="0" fill="hold" nodeType="withEffect">
+                                  <p:stCondLst>
+                                    <p:cond delay="0"/>
+                                  </p:stCondLst>
+                                  <p:childTnLst>
+                                    <p:set>
+                                      <p:cBhvr>
+                                        <p:cTn id="8" dur="1" fill="hold">
+                                          <p:stCondLst>
+                                            <p:cond delay="0"/>
+                                          </p:stCondLst>
+                                        </p:cTn>
+                                        <p:tgtEl>
+                                          <p:spTgt spid="78"/>
+                                        </p:tgtEl>
+                                        <p:attrNameLst>
+                                          <p:attrName>style.visibility</p:attrName>
+                                        </p:attrNameLst>
+                                      </p:cBhvr>
+                                      <p:to>
+                                        <p:strVal val="visible"/>
+                                      </p:to>
+                                    </p:set>
+                                  </p:childTnLst>
+                                </p:cTn>
+                              </p:par>
+                            </p:childTnLst>
+                          </p:cTn>
+                        </p:par>
+                      </p:childTnLst>
+                    </p:cTn>
+                  </p:par>
+                </p:childTnLst>
+              </p:cTn>
+              <p:prevCondLst>
+                <p:cond evt="onPrev" delay="0">
+                  <p:tgtEl>
+                    <p:sldTgt/>
+                  </p:tgtEl>
+                </p:cond>
+              </p:prevCondLst>
+              <p:nextCondLst>
+                <p:cond evt="onNext" delay="0">
+                  <p:tgtEl>
+                    <p:sldTgt/>
+                  </p:tgtEl>
+                </p:cond>
+              </p:nextCondLst>
+            </p:seq>
+          </p:childTnLst>
+        </p:cTn>
+      </p:par>
+    </p:tnLst>
+    <p:bldLst>
+      <p:bldP spid="9" grpId="0" animBg="1"/>
+    </p:bldLst>
+  </p:timing>
 </p:sld>
 </file>
 
@@ -9697,7 +9781,7 @@
           <a:p>
             <a:fld id="{6700A58B-DD98-43D0-B791-721480A02982}" type="datetime1">
               <a:rPr lang="en-US" smtClean="0"/>
-              <a:t>10/26/20</a:t>
+              <a:t>3/22/21</a:t>
             </a:fld>
             <a:endParaRPr lang="en-US"/>
           </a:p>
@@ -10084,25 +10168,7 @@
             </a:r>
           </a:p>
           <a:p>
-            <a:pPr marL="914400" lvl="1" indent="-228600">
-              <a:buFont typeface="Open Sans"/>
-              <a:buChar char="○"/>
-            </a:pPr>
-            <a:r>
-              <a:rPr lang="en" sz="1200" dirty="0">
-                <a:latin typeface="Open Sans"/>
-                <a:ea typeface="Open Sans"/>
-                <a:cs typeface="Open Sans"/>
-                <a:sym typeface="Open Sans"/>
-              </a:rPr>
-              <a:t>Each tree then casts a vote for the unknown value.</a:t>
-            </a:r>
-          </a:p>
-          <a:p>
-            <a:pPr marL="457200" indent="-228600">
-              <a:buFont typeface="Open Sans"/>
-              <a:buChar char="●"/>
-            </a:pPr>
+            <a:pPr marL="685800" lvl="1"/>
             <a:endParaRPr lang="en" sz="1200" dirty="0">
               <a:latin typeface="Open Sans"/>
               <a:ea typeface="Open Sans"/>
@@ -12907,7 +12973,7 @@
           <a:p>
             <a:fld id="{6700A58B-DD98-43D0-B791-721480A02982}" type="datetime1">
               <a:rPr lang="en-US" smtClean="0"/>
-              <a:t>10/26/20</a:t>
+              <a:t>3/22/21</a:t>
             </a:fld>
             <a:endParaRPr lang="en-US"/>
           </a:p>
@@ -13711,7 +13777,7 @@
           <a:p>
             <a:fld id="{6700A58B-DD98-43D0-B791-721480A02982}" type="datetime1">
               <a:rPr lang="en-US" smtClean="0"/>
-              <a:t>10/26/20</a:t>
+              <a:t>3/22/21</a:t>
             </a:fld>
             <a:endParaRPr lang="en-US"/>
           </a:p>
@@ -14123,7 +14189,7 @@
           <a:p>
             <a:fld id="{6700A58B-DD98-43D0-B791-721480A02982}" type="datetime1">
               <a:rPr lang="en-US" smtClean="0"/>
-              <a:t>10/26/20</a:t>
+              <a:t>3/22/21</a:t>
             </a:fld>
             <a:endParaRPr lang="en-US"/>
           </a:p>
@@ -14372,7 +14438,7 @@
           <a:p>
             <a:fld id="{9B19E99B-5349-415A-8E56-8E989211A366}" type="datetime1">
               <a:rPr lang="en-US" smtClean="0"/>
-              <a:t>10/26/20</a:t>
+              <a:t>3/22/21</a:t>
             </a:fld>
             <a:endParaRPr lang="en-US"/>
           </a:p>

</xml_diff>